<commit_message>
Made suggested changes to notebook and presentation
</commit_message>
<xml_diff>
--- a/presentation.pptx
+++ b/presentation.pptx
@@ -12468,27 +12468,26 @@
           <a:lstStyle/>
           <a:p>
             <a:r>
-              <a:rPr lang="en-US" dirty="0"/>
+              <a:rPr lang="en-US"/>
               <a:t>Governance Indicators Through Time</a:t>
             </a:r>
+            <a:endParaRPr lang="en-US" dirty="0"/>
           </a:p>
         </p:txBody>
       </p:sp>
       <p:pic>
         <p:nvPicPr>
-          <p:cNvPr id="10" name="Marcador de contenido 9">
+          <p:cNvPr id="18" name="Imagen 17">
             <a:extLst>
               <a:ext uri="{FF2B5EF4-FFF2-40B4-BE49-F238E27FC236}">
-                <a16:creationId xmlns:a16="http://schemas.microsoft.com/office/drawing/2014/main" id="{AF63A8C5-E482-0442-A4BE-3BE50FDA9D03}"/>
+                <a16:creationId xmlns:a16="http://schemas.microsoft.com/office/drawing/2014/main" id="{F7F0F286-7E87-7A46-8C0E-EBFF6D1ABFFF}"/>
               </a:ext>
             </a:extLst>
           </p:cNvPr>
           <p:cNvPicPr>
-            <a:picLocks noGrp="1" noChangeAspect="1"/>
+            <a:picLocks noChangeAspect="1"/>
           </p:cNvPicPr>
-          <p:nvPr>
-            <p:ph idx="1"/>
-          </p:nvPr>
+          <p:nvPr/>
         </p:nvPicPr>
         <p:blipFill>
           <a:blip r:embed="rId2"/>
@@ -12498,9 +12497,12 @@
         </p:blipFill>
         <p:spPr>
           <a:xfrm>
-            <a:off x="2444161" y="2181225"/>
-            <a:ext cx="7303678" cy="3678238"/>
+            <a:off x="1886856" y="2021507"/>
+            <a:ext cx="8144329" cy="4476191"/>
           </a:xfrm>
+          <a:prstGeom prst="rect">
+            <a:avLst/>
+          </a:prstGeom>
         </p:spPr>
       </p:pic>
     </p:spTree>
@@ -12563,19 +12565,17 @@
       </p:sp>
       <p:pic>
         <p:nvPicPr>
-          <p:cNvPr id="5" name="Marcador de contenido 4">
+          <p:cNvPr id="22" name="Imagen 21">
             <a:extLst>
               <a:ext uri="{FF2B5EF4-FFF2-40B4-BE49-F238E27FC236}">
-                <a16:creationId xmlns:a16="http://schemas.microsoft.com/office/drawing/2014/main" id="{87470178-2D13-6942-9EC7-D4B5B27CE837}"/>
+                <a16:creationId xmlns:a16="http://schemas.microsoft.com/office/drawing/2014/main" id="{1123049F-76B6-6A47-8203-199017FD4CDD}"/>
               </a:ext>
             </a:extLst>
           </p:cNvPr>
           <p:cNvPicPr>
-            <a:picLocks noGrp="1" noChangeAspect="1"/>
+            <a:picLocks noChangeAspect="1"/>
           </p:cNvPicPr>
-          <p:nvPr>
-            <p:ph idx="1"/>
-          </p:nvPr>
+          <p:nvPr/>
         </p:nvPicPr>
         <p:blipFill>
           <a:blip r:embed="rId2"/>
@@ -12585,17 +12585,20 @@
         </p:blipFill>
         <p:spPr>
           <a:xfrm>
-            <a:off x="8010179" y="2129279"/>
-            <a:ext cx="3641926" cy="1873675"/>
+            <a:off x="394881" y="2087022"/>
+            <a:ext cx="3631584" cy="1961518"/>
           </a:xfrm>
+          <a:prstGeom prst="rect">
+            <a:avLst/>
+          </a:prstGeom>
         </p:spPr>
       </p:pic>
       <p:pic>
         <p:nvPicPr>
-          <p:cNvPr id="7" name="Imagen 6">
+          <p:cNvPr id="24" name="Imagen 23">
             <a:extLst>
               <a:ext uri="{FF2B5EF4-FFF2-40B4-BE49-F238E27FC236}">
-                <a16:creationId xmlns:a16="http://schemas.microsoft.com/office/drawing/2014/main" id="{F339DB69-5873-7A48-98F8-0ADA8D6559B1}"/>
+                <a16:creationId xmlns:a16="http://schemas.microsoft.com/office/drawing/2014/main" id="{D0CAAE0F-B48D-0748-B165-83F2149D3C13}"/>
               </a:ext>
             </a:extLst>
           </p:cNvPr>
@@ -12612,8 +12615,8 @@
         </p:blipFill>
         <p:spPr>
           <a:xfrm>
-            <a:off x="506387" y="2129279"/>
-            <a:ext cx="3613174" cy="1873675"/>
+            <a:off x="8094898" y="4237222"/>
+            <a:ext cx="3646536" cy="2011553"/>
           </a:xfrm>
           <a:prstGeom prst="rect">
             <a:avLst/>
@@ -12622,10 +12625,10 @@
       </p:pic>
       <p:pic>
         <p:nvPicPr>
-          <p:cNvPr id="9" name="Imagen 8">
+          <p:cNvPr id="26" name="Imagen 25">
             <a:extLst>
               <a:ext uri="{FF2B5EF4-FFF2-40B4-BE49-F238E27FC236}">
-                <a16:creationId xmlns:a16="http://schemas.microsoft.com/office/drawing/2014/main" id="{DE07C65A-C88C-EA48-BBF1-5CA7560C077C}"/>
+                <a16:creationId xmlns:a16="http://schemas.microsoft.com/office/drawing/2014/main" id="{64D2C052-D5AB-2946-ACD5-A778728D95E5}"/>
               </a:ext>
             </a:extLst>
           </p:cNvPr>
@@ -12642,8 +12645,8 @@
         </p:blipFill>
         <p:spPr>
           <a:xfrm>
-            <a:off x="4208384" y="2129279"/>
-            <a:ext cx="3641926" cy="1873675"/>
+            <a:off x="322728" y="4288980"/>
+            <a:ext cx="3703737" cy="2011553"/>
           </a:xfrm>
           <a:prstGeom prst="rect">
             <a:avLst/>
@@ -12652,10 +12655,10 @@
       </p:pic>
       <p:pic>
         <p:nvPicPr>
-          <p:cNvPr id="11" name="Imagen 10">
+          <p:cNvPr id="28" name="Imagen 27">
             <a:extLst>
               <a:ext uri="{FF2B5EF4-FFF2-40B4-BE49-F238E27FC236}">
-                <a16:creationId xmlns:a16="http://schemas.microsoft.com/office/drawing/2014/main" id="{AA2C7CAE-03AC-0C44-9C3A-4DF51554897E}"/>
+                <a16:creationId xmlns:a16="http://schemas.microsoft.com/office/drawing/2014/main" id="{6D6FE112-408B-5C4D-A387-0328EB8D9F04}"/>
               </a:ext>
             </a:extLst>
           </p:cNvPr>
@@ -12672,8 +12675,8 @@
         </p:blipFill>
         <p:spPr>
           <a:xfrm>
-            <a:off x="483123" y="4436637"/>
-            <a:ext cx="3656302" cy="1892843"/>
+            <a:off x="4273184" y="2091649"/>
+            <a:ext cx="3589948" cy="1952265"/>
           </a:xfrm>
           <a:prstGeom prst="rect">
             <a:avLst/>
@@ -12682,10 +12685,10 @@
       </p:pic>
       <p:pic>
         <p:nvPicPr>
-          <p:cNvPr id="13" name="Imagen 12">
+          <p:cNvPr id="30" name="Imagen 29">
             <a:extLst>
               <a:ext uri="{FF2B5EF4-FFF2-40B4-BE49-F238E27FC236}">
-                <a16:creationId xmlns:a16="http://schemas.microsoft.com/office/drawing/2014/main" id="{425659F0-6D0E-7C4D-BB2A-ECABFAB6026C}"/>
+                <a16:creationId xmlns:a16="http://schemas.microsoft.com/office/drawing/2014/main" id="{9AD9021D-3DE8-CC48-AF87-ACDDBAC4A897}"/>
               </a:ext>
             </a:extLst>
           </p:cNvPr>
@@ -12702,8 +12705,8 @@
         </p:blipFill>
         <p:spPr>
           <a:xfrm>
-            <a:off x="4205799" y="4431845"/>
-            <a:ext cx="3646717" cy="1902427"/>
+            <a:off x="8109850" y="2093961"/>
+            <a:ext cx="3631584" cy="1947640"/>
           </a:xfrm>
           <a:prstGeom prst="rect">
             <a:avLst/>
@@ -12712,10 +12715,10 @@
       </p:pic>
       <p:pic>
         <p:nvPicPr>
-          <p:cNvPr id="15" name="Imagen 14">
+          <p:cNvPr id="32" name="Imagen 31">
             <a:extLst>
               <a:ext uri="{FF2B5EF4-FFF2-40B4-BE49-F238E27FC236}">
-                <a16:creationId xmlns:a16="http://schemas.microsoft.com/office/drawing/2014/main" id="{9C629051-5FAD-CC4D-B610-4E73AB9E60F5}"/>
+                <a16:creationId xmlns:a16="http://schemas.microsoft.com/office/drawing/2014/main" id="{FE601033-3A1F-F644-8A11-67A41E7AA591}"/>
               </a:ext>
             </a:extLst>
           </p:cNvPr>
@@ -12732,8 +12735,8 @@
         </p:blipFill>
         <p:spPr>
           <a:xfrm>
-            <a:off x="7882395" y="4443825"/>
-            <a:ext cx="3627550" cy="1878467"/>
+            <a:off x="4211196" y="4250636"/>
+            <a:ext cx="3698970" cy="2016320"/>
           </a:xfrm>
           <a:prstGeom prst="rect">
             <a:avLst/>
@@ -12946,19 +12949,17 @@
       </p:pic>
       <p:pic>
         <p:nvPicPr>
-          <p:cNvPr id="15" name="Marcador de contenido 14">
+          <p:cNvPr id="19" name="Imagen 18">
             <a:extLst>
               <a:ext uri="{FF2B5EF4-FFF2-40B4-BE49-F238E27FC236}">
-                <a16:creationId xmlns:a16="http://schemas.microsoft.com/office/drawing/2014/main" id="{D0CB9DAB-8EBE-5648-AB07-8F8878B4DF25}"/>
+                <a16:creationId xmlns:a16="http://schemas.microsoft.com/office/drawing/2014/main" id="{F745F45B-3A13-8A45-A7E3-C39B6A4B41C8}"/>
               </a:ext>
             </a:extLst>
           </p:cNvPr>
           <p:cNvPicPr>
-            <a:picLocks noGrp="1" noChangeAspect="1"/>
+            <a:picLocks noChangeAspect="1"/>
           </p:cNvPicPr>
-          <p:nvPr>
-            <p:ph sz="half" idx="2"/>
-          </p:nvPr>
+          <p:nvPr/>
         </p:nvPicPr>
         <p:blipFill>
           <a:blip r:embed="rId4"/>
@@ -12968,9 +12969,12 @@
         </p:blipFill>
         <p:spPr>
           <a:xfrm>
-            <a:off x="6096000" y="1991665"/>
-            <a:ext cx="2273300" cy="1104900"/>
+            <a:off x="5406808" y="1991665"/>
+            <a:ext cx="4445000" cy="1193800"/>
           </a:xfrm>
+          <a:prstGeom prst="rect">
+            <a:avLst/>
+          </a:prstGeom>
         </p:spPr>
       </p:pic>
     </p:spTree>

</xml_diff>